<commit_message>
Updated Project Timeline - 15/08 for research instead of 16/08
</commit_message>
<xml_diff>
--- a/Deliverables/Project Timeline.pptx
+++ b/Deliverables/Project Timeline.pptx
@@ -116,6 +116,9 @@
           </p14:sldIdLst>
         </p14:section>
       </p14:sectionLst>
+    </p:ext>
+    <p:ext uri="{EFAFB233-063F-42B5-8137-9DF3F51BA10A}">
+      <p15:sldGuideLst xmlns:p15="http://schemas.microsoft.com/office/powerpoint/2012/main"/>
     </p:ext>
   </p:extLst>
 </p:presentation>
@@ -4188,7 +4191,7 @@
             </p:custDataLst>
             <p:extLst>
               <p:ext uri="{D42A27DB-BD31-4B8C-83A1-F6EECF244321}">
-                <p14:modId xmlns:p14="http://schemas.microsoft.com/office/powerpoint/2010/main" val="636355086"/>
+                <p14:modId xmlns:p14="http://schemas.microsoft.com/office/powerpoint/2010/main" val="1890013638"/>
               </p:ext>
             </p:extLst>
           </p:nvPr>
@@ -9407,8 +9410,8 @@
         </p:nvSpPr>
         <p:spPr bwMode="auto">
           <a:xfrm>
-            <a:off x="4773613" y="2878138"/>
-            <a:ext cx="463550" cy="98425"/>
+            <a:off x="4773614" y="2878138"/>
+            <a:ext cx="371475" cy="98425"/>
           </a:xfrm>
           <a:prstGeom prst="rect">
             <a:avLst/>
@@ -15039,7 +15042,7 @@
         </p:nvSpPr>
         <p:spPr bwMode="auto">
           <a:xfrm>
-            <a:off x="4195763" y="2994025"/>
+            <a:off x="4149725" y="2994025"/>
             <a:ext cx="1620838" cy="165100"/>
           </a:xfrm>
           <a:prstGeom prst="rect">
@@ -15236,17 +15239,23 @@
               <a:t>12/08/2024</a:t>
             </a:fld>
             <a:r>
+              <a:rPr lang="en-AU" altLang="en-US" sz="1200" dirty="0">
+                <a:effectLst/>
+              </a:rPr>
+              <a:t> </a:t>
+            </a:r>
+            <a:r>
               <a:rPr lang="en-AU" altLang="en-US" sz="1200">
                 <a:effectLst/>
               </a:rPr>
-              <a:t> - </a:t>
+              <a:t>- </a:t>
             </a:r>
-            <a:fld id="{25CC4B29-1FE4-4403-BE5D-73E0688A5DBD}" type="datetime'''''''1''6/''08/2''''''''''''0''''''''''2''''''''4'''''''''">
+            <a:fld id="{E538B9F2-32C2-42B8-8C5C-F952C5162CAF}" type="datetime'1''''5''/''''08''/2''02''''''''''4'''''''">
               <a:rPr lang="en-AU" altLang="en-US" sz="1200" smtClean="0">
                 <a:effectLst/>
               </a:rPr>
               <a:pPr/>
-              <a:t>16/08/2024</a:t>
+              <a:t>15/08/2024</a:t>
             </a:fld>
             <a:endParaRPr lang="en-AU" sz="1200" dirty="0"/>
           </a:p>

</xml_diff>